<commit_message>
Finish slides for presentation on 5/19/16
</commit_message>
<xml_diff>
--- a/Building Your Team to Last.pptx
+++ b/Building Your Team to Last.pptx
@@ -7485,6 +7485,13 @@
       <p:transition spd="slow"/>
     </mc:Fallback>
   </mc:AlternateContent>
+  <p:timing>
+    <p:tnLst>
+      <p:par>
+        <p:cTn id="1" dur="indefinite" restart="never" nodeType="tmRoot"/>
+      </p:par>
+    </p:tnLst>
+  </p:timing>
 </p:sld>
 </file>
 
@@ -7595,6 +7602,13 @@
       <p:transition spd="slow"/>
     </mc:Fallback>
   </mc:AlternateContent>
+  <p:timing>
+    <p:tnLst>
+      <p:par>
+        <p:cTn id="1" dur="indefinite" restart="never" nodeType="tmRoot"/>
+      </p:par>
+    </p:tnLst>
+  </p:timing>
 </p:sld>
 </file>
 
@@ -7708,13 +7722,9 @@
             </a:pPr>
             <a:r>
               <a:rPr lang="en-US" dirty="0" smtClean="0"/>
-              <a:t>Please ask </a:t>
-            </a:r>
-            <a:r>
-              <a:rPr lang="en-US" smtClean="0"/>
-              <a:t>any questions you may have too!</a:t>
-            </a:r>
-            <a:endParaRPr lang="en-US"/>
+              <a:t>Please ask any questions you may have too!</a:t>
+            </a:r>
+            <a:endParaRPr lang="en-US" dirty="0"/>
           </a:p>
         </p:txBody>
       </p:sp>
@@ -7736,6 +7746,13 @@
       <p:transition spd="slow"/>
     </mc:Fallback>
   </mc:AlternateContent>
+  <p:timing>
+    <p:tnLst>
+      <p:par>
+        <p:cTn id="1" dur="indefinite" restart="never" nodeType="tmRoot"/>
+      </p:par>
+    </p:tnLst>
+  </p:timing>
 </p:sld>
 </file>
 
@@ -8962,6 +8979,13 @@
       <p:transition spd="slow"/>
     </mc:Fallback>
   </mc:AlternateContent>
+  <p:timing>
+    <p:tnLst>
+      <p:par>
+        <p:cTn id="1" dur="indefinite" restart="never" nodeType="tmRoot"/>
+      </p:par>
+    </p:tnLst>
+  </p:timing>
 </p:sld>
 </file>
 

</xml_diff>